<commit_message>
Carried out model prediction sets 12-16, modified the 'source' Python files and batch scripts to carry these out, and added a project overview, glossary of acronyms and terms, and an explanation of the reference documents used.
</commit_message>
<xml_diff>
--- a/report_stuff/Script pipeline diagram.pptx
+++ b/report_stuff/Script pipeline diagram.pptx
@@ -273,7 +273,7 @@
           <a:p>
             <a:fld id="{ADB34385-8596-4F93-9C6D-76F56927ACBC}" type="datetimeFigureOut">
               <a:rPr lang="en-GB" smtClean="0"/>
-              <a:t>02/08/2019</a:t>
+              <a:t>13/08/2019</a:t>
             </a:fld>
             <a:endParaRPr lang="en-GB"/>
           </a:p>
@@ -473,7 +473,7 @@
           <a:p>
             <a:fld id="{ADB34385-8596-4F93-9C6D-76F56927ACBC}" type="datetimeFigureOut">
               <a:rPr lang="en-GB" smtClean="0"/>
-              <a:t>02/08/2019</a:t>
+              <a:t>13/08/2019</a:t>
             </a:fld>
             <a:endParaRPr lang="en-GB"/>
           </a:p>
@@ -683,7 +683,7 @@
           <a:p>
             <a:fld id="{ADB34385-8596-4F93-9C6D-76F56927ACBC}" type="datetimeFigureOut">
               <a:rPr lang="en-GB" smtClean="0"/>
-              <a:t>02/08/2019</a:t>
+              <a:t>13/08/2019</a:t>
             </a:fld>
             <a:endParaRPr lang="en-GB"/>
           </a:p>
@@ -883,7 +883,7 @@
           <a:p>
             <a:fld id="{ADB34385-8596-4F93-9C6D-76F56927ACBC}" type="datetimeFigureOut">
               <a:rPr lang="en-GB" smtClean="0"/>
-              <a:t>02/08/2019</a:t>
+              <a:t>13/08/2019</a:t>
             </a:fld>
             <a:endParaRPr lang="en-GB"/>
           </a:p>
@@ -1159,7 +1159,7 @@
           <a:p>
             <a:fld id="{ADB34385-8596-4F93-9C6D-76F56927ACBC}" type="datetimeFigureOut">
               <a:rPr lang="en-GB" smtClean="0"/>
-              <a:t>02/08/2019</a:t>
+              <a:t>13/08/2019</a:t>
             </a:fld>
             <a:endParaRPr lang="en-GB"/>
           </a:p>
@@ -1427,7 +1427,7 @@
           <a:p>
             <a:fld id="{ADB34385-8596-4F93-9C6D-76F56927ACBC}" type="datetimeFigureOut">
               <a:rPr lang="en-GB" smtClean="0"/>
-              <a:t>02/08/2019</a:t>
+              <a:t>13/08/2019</a:t>
             </a:fld>
             <a:endParaRPr lang="en-GB"/>
           </a:p>
@@ -1842,7 +1842,7 @@
           <a:p>
             <a:fld id="{ADB34385-8596-4F93-9C6D-76F56927ACBC}" type="datetimeFigureOut">
               <a:rPr lang="en-GB" smtClean="0"/>
-              <a:t>02/08/2019</a:t>
+              <a:t>13/08/2019</a:t>
             </a:fld>
             <a:endParaRPr lang="en-GB"/>
           </a:p>
@@ -1984,7 +1984,7 @@
           <a:p>
             <a:fld id="{ADB34385-8596-4F93-9C6D-76F56927ACBC}" type="datetimeFigureOut">
               <a:rPr lang="en-GB" smtClean="0"/>
-              <a:t>02/08/2019</a:t>
+              <a:t>13/08/2019</a:t>
             </a:fld>
             <a:endParaRPr lang="en-GB"/>
           </a:p>
@@ -2097,7 +2097,7 @@
           <a:p>
             <a:fld id="{ADB34385-8596-4F93-9C6D-76F56927ACBC}" type="datetimeFigureOut">
               <a:rPr lang="en-GB" smtClean="0"/>
-              <a:t>02/08/2019</a:t>
+              <a:t>13/08/2019</a:t>
             </a:fld>
             <a:endParaRPr lang="en-GB"/>
           </a:p>
@@ -2410,7 +2410,7 @@
           <a:p>
             <a:fld id="{ADB34385-8596-4F93-9C6D-76F56927ACBC}" type="datetimeFigureOut">
               <a:rPr lang="en-GB" smtClean="0"/>
-              <a:t>02/08/2019</a:t>
+              <a:t>13/08/2019</a:t>
             </a:fld>
             <a:endParaRPr lang="en-GB"/>
           </a:p>
@@ -2699,7 +2699,7 @@
           <a:p>
             <a:fld id="{ADB34385-8596-4F93-9C6D-76F56927ACBC}" type="datetimeFigureOut">
               <a:rPr lang="en-GB" smtClean="0"/>
-              <a:t>02/08/2019</a:t>
+              <a:t>13/08/2019</a:t>
             </a:fld>
             <a:endParaRPr lang="en-GB"/>
           </a:p>
@@ -2942,7 +2942,7 @@
           <a:p>
             <a:fld id="{ADB34385-8596-4F93-9C6D-76F56927ACBC}" type="datetimeFigureOut">
               <a:rPr lang="en-GB" smtClean="0"/>
-              <a:t>02/08/2019</a:t>
+              <a:t>13/08/2019</a:t>
             </a:fld>
             <a:endParaRPr lang="en-GB"/>
           </a:p>
@@ -4772,8 +4772,8 @@
         </p:nvSpPr>
         <p:spPr bwMode="auto">
           <a:xfrm>
-            <a:off x="4227060" y="1026931"/>
-            <a:ext cx="1284288" cy="441325"/>
+            <a:off x="5102573" y="764374"/>
+            <a:ext cx="891957" cy="769441"/>
           </a:xfrm>
           <a:prstGeom prst="rect">
             <a:avLst/>
@@ -5994,51 +5994,6 @@
           </a:p>
         </p:txBody>
       </p:sp>
-      <p:sp>
-        <p:nvSpPr>
-          <p:cNvPr id="91" name="Arrow: Down 90">
-            <a:extLst>
-              <a:ext uri="{FF2B5EF4-FFF2-40B4-BE49-F238E27FC236}">
-                <a16:creationId xmlns:a16="http://schemas.microsoft.com/office/drawing/2014/main" id="{059EFE09-7587-4CB9-A96F-C7794A9EB5C2}"/>
-              </a:ext>
-            </a:extLst>
-          </p:cNvPr>
-          <p:cNvSpPr/>
-          <p:nvPr/>
-        </p:nvSpPr>
-        <p:spPr>
-          <a:xfrm rot="16200000">
-            <a:off x="3871582" y="1043526"/>
-            <a:ext cx="206375" cy="407035"/>
-          </a:xfrm>
-          <a:prstGeom prst="downArrow">
-            <a:avLst/>
-          </a:prstGeom>
-        </p:spPr>
-        <p:style>
-          <a:lnRef idx="2">
-            <a:schemeClr val="accent1">
-              <a:shade val="50000"/>
-            </a:schemeClr>
-          </a:lnRef>
-          <a:fillRef idx="1">
-            <a:schemeClr val="accent1"/>
-          </a:fillRef>
-          <a:effectRef idx="0">
-            <a:schemeClr val="accent1"/>
-          </a:effectRef>
-          <a:fontRef idx="minor">
-            <a:schemeClr val="lt1"/>
-          </a:fontRef>
-        </p:style>
-        <p:txBody>
-          <a:bodyPr rtlCol="0" anchor="ctr"/>
-          <a:lstStyle/>
-          <a:p>
-            <a:endParaRPr lang="en-GB"/>
-          </a:p>
-        </p:txBody>
-      </p:sp>
       <p:pic>
         <p:nvPicPr>
           <p:cNvPr id="2127" name="Picture 46">
@@ -6068,7 +6023,7 @@
         </p:blipFill>
         <p:spPr bwMode="auto">
           <a:xfrm>
-            <a:off x="4159945" y="20074"/>
+            <a:off x="3730730" y="614188"/>
             <a:ext cx="1239838" cy="990600"/>
           </a:xfrm>
           <a:prstGeom prst="rect">
@@ -7464,6 +7419,215 @@
               <a:effectLst/>
               <a:latin typeface="Arial" panose="020B0604020202020204" pitchFamily="34" charset="0"/>
             </a:endParaRPr>
+          </a:p>
+        </p:txBody>
+      </p:sp>
+      <p:sp>
+        <p:nvSpPr>
+          <p:cNvPr id="67" name="Arrow: Down 66">
+            <a:extLst>
+              <a:ext uri="{FF2B5EF4-FFF2-40B4-BE49-F238E27FC236}">
+                <a16:creationId xmlns:a16="http://schemas.microsoft.com/office/drawing/2014/main" id="{0FAF69BB-9857-4CBB-AB9A-FE44CB53F9B9}"/>
+              </a:ext>
+            </a:extLst>
+          </p:cNvPr>
+          <p:cNvSpPr/>
+          <p:nvPr/>
+        </p:nvSpPr>
+        <p:spPr>
+          <a:xfrm rot="16200000">
+            <a:off x="3887848" y="83444"/>
+            <a:ext cx="206375" cy="407035"/>
+          </a:xfrm>
+          <a:prstGeom prst="downArrow">
+            <a:avLst/>
+          </a:prstGeom>
+        </p:spPr>
+        <p:style>
+          <a:lnRef idx="2">
+            <a:schemeClr val="accent1">
+              <a:shade val="50000"/>
+            </a:schemeClr>
+          </a:lnRef>
+          <a:fillRef idx="1">
+            <a:schemeClr val="accent1"/>
+          </a:fillRef>
+          <a:effectRef idx="0">
+            <a:schemeClr val="accent1"/>
+          </a:effectRef>
+          <a:fontRef idx="minor">
+            <a:schemeClr val="lt1"/>
+          </a:fontRef>
+        </p:style>
+        <p:txBody>
+          <a:bodyPr rtlCol="0" anchor="ctr"/>
+          <a:lstStyle/>
+          <a:p>
+            <a:endParaRPr lang="en-GB"/>
+          </a:p>
+        </p:txBody>
+      </p:sp>
+      <p:sp>
+        <p:nvSpPr>
+          <p:cNvPr id="68" name="TextBox 4">
+            <a:extLst>
+              <a:ext uri="{FF2B5EF4-FFF2-40B4-BE49-F238E27FC236}">
+                <a16:creationId xmlns:a16="http://schemas.microsoft.com/office/drawing/2014/main" id="{15ED52DD-8CBC-4D0C-A60A-5234031F1E2F}"/>
+              </a:ext>
+            </a:extLst>
+          </p:cNvPr>
+          <p:cNvSpPr txBox="1">
+            <a:spLocks noChangeArrowheads="1"/>
+          </p:cNvSpPr>
+          <p:nvPr/>
+        </p:nvSpPr>
+        <p:spPr bwMode="auto">
+          <a:xfrm>
+            <a:off x="4232159" y="142371"/>
+            <a:ext cx="1141465" cy="288925"/>
+          </a:xfrm>
+          <a:prstGeom prst="rect">
+            <a:avLst/>
+          </a:prstGeom>
+          <a:noFill/>
+          <a:ln w="9525">
+            <a:solidFill>
+              <a:srgbClr val="000000"/>
+            </a:solidFill>
+            <a:miter lim="800000"/>
+            <a:headEnd/>
+            <a:tailEnd/>
+          </a:ln>
+          <a:extLst>
+            <a:ext uri="{909E8E84-426E-40DD-AFC4-6F175D3DCCD1}">
+              <a14:hiddenFill xmlns:a14="http://schemas.microsoft.com/office/drawing/2010/main">
+                <a:solidFill>
+                  <a:srgbClr val="FFFFFF"/>
+                </a:solidFill>
+              </a14:hiddenFill>
+            </a:ext>
+          </a:extLst>
+        </p:spPr>
+        <p:txBody>
+          <a:bodyPr vert="horz" wrap="square" lIns="91440" tIns="45720" rIns="91440" bIns="45720" numCol="1" anchor="t" anchorCtr="0" compatLnSpc="1">
+            <a:prstTxWarp prst="textNoShape">
+              <a:avLst/>
+            </a:prstTxWarp>
+          </a:bodyPr>
+          <a:lstStyle/>
+          <a:p>
+            <a:pPr marL="0" marR="0" lvl="0" indent="0" algn="l" defTabSz="914400" rtl="0" eaLnBrk="0" fontAlgn="base" latinLnBrk="0" hangingPunct="0">
+              <a:lnSpc>
+                <a:spcPct val="100000"/>
+              </a:lnSpc>
+              <a:spcBef>
+                <a:spcPct val="0"/>
+              </a:spcBef>
+              <a:spcAft>
+                <a:spcPct val="0"/>
+              </a:spcAft>
+              <a:buClrTx/>
+              <a:buSzTx/>
+              <a:buFontTx/>
+              <a:buNone/>
+              <a:tabLst/>
+            </a:pPr>
+            <a:r>
+              <a:rPr kumimoji="0" lang="en-US" altLang="en-US" sz="1100" b="1" i="0" u="none" strike="noStrike" cap="none" normalizeH="0" baseline="0" dirty="0">
+                <a:ln>
+                  <a:noFill/>
+                </a:ln>
+                <a:solidFill>
+                  <a:srgbClr val="000000"/>
+                </a:solidFill>
+                <a:effectLst/>
+                <a:latin typeface="Calibri" panose="020F0502020204030204" pitchFamily="34" charset="0"/>
+                <a:ea typeface="Calibri" panose="020F0502020204030204" pitchFamily="34" charset="0"/>
+                <a:cs typeface="Times New Roman" panose="02020603050405020304" pitchFamily="18" charset="0"/>
+              </a:rPr>
+              <a:t>‘</a:t>
+            </a:r>
+            <a:r>
+              <a:rPr lang="en-US" altLang="en-US" sz="1100" b="1" dirty="0">
+                <a:solidFill>
+                  <a:srgbClr val="000000"/>
+                </a:solidFill>
+                <a:latin typeface="Calibri" panose="020F0502020204030204" pitchFamily="34" charset="0"/>
+                <a:ea typeface="Calibri" panose="020F0502020204030204" pitchFamily="34" charset="0"/>
+                <a:cs typeface="Times New Roman" panose="02020603050405020304" pitchFamily="18" charset="0"/>
+              </a:rPr>
+              <a:t>dis_3d_pos</a:t>
+            </a:r>
+            <a:r>
+              <a:rPr kumimoji="0" lang="en-US" altLang="en-US" sz="1100" b="1" i="0" u="none" strike="noStrike" cap="none" normalizeH="0" baseline="0" dirty="0">
+                <a:ln>
+                  <a:noFill/>
+                </a:ln>
+                <a:solidFill>
+                  <a:srgbClr val="000000"/>
+                </a:solidFill>
+                <a:effectLst/>
+                <a:latin typeface="Calibri" panose="020F0502020204030204" pitchFamily="34" charset="0"/>
+                <a:ea typeface="Calibri" panose="020F0502020204030204" pitchFamily="34" charset="0"/>
+                <a:cs typeface="Times New Roman" panose="02020603050405020304" pitchFamily="18" charset="0"/>
+              </a:rPr>
+              <a:t>.py’</a:t>
+            </a:r>
+            <a:endParaRPr kumimoji="0" lang="en-US" altLang="en-US" sz="1800" b="0" i="0" u="none" strike="noStrike" cap="none" normalizeH="0" baseline="0" dirty="0">
+              <a:ln>
+                <a:noFill/>
+              </a:ln>
+              <a:solidFill>
+                <a:schemeClr val="tx1"/>
+              </a:solidFill>
+              <a:effectLst/>
+              <a:latin typeface="Arial" panose="020B0604020202020204" pitchFamily="34" charset="0"/>
+            </a:endParaRPr>
+          </a:p>
+        </p:txBody>
+      </p:sp>
+      <p:sp>
+        <p:nvSpPr>
+          <p:cNvPr id="69" name="Arrow: Down 68">
+            <a:extLst>
+              <a:ext uri="{FF2B5EF4-FFF2-40B4-BE49-F238E27FC236}">
+                <a16:creationId xmlns:a16="http://schemas.microsoft.com/office/drawing/2014/main" id="{3882CF63-FA2D-47D6-917B-E2441E2724ED}"/>
+              </a:ext>
+            </a:extLst>
+          </p:cNvPr>
+          <p:cNvSpPr/>
+          <p:nvPr/>
+        </p:nvSpPr>
+        <p:spPr>
+          <a:xfrm>
+            <a:off x="4630759" y="513920"/>
+            <a:ext cx="249093" cy="396733"/>
+          </a:xfrm>
+          <a:prstGeom prst="downArrow">
+            <a:avLst/>
+          </a:prstGeom>
+        </p:spPr>
+        <p:style>
+          <a:lnRef idx="2">
+            <a:schemeClr val="accent1">
+              <a:shade val="50000"/>
+            </a:schemeClr>
+          </a:lnRef>
+          <a:fillRef idx="1">
+            <a:schemeClr val="accent1"/>
+          </a:fillRef>
+          <a:effectRef idx="0">
+            <a:schemeClr val="accent1"/>
+          </a:effectRef>
+          <a:fontRef idx="minor">
+            <a:schemeClr val="lt1"/>
+          </a:fontRef>
+        </p:style>
+        <p:txBody>
+          <a:bodyPr rtlCol="0" anchor="ctr"/>
+          <a:lstStyle/>
+          <a:p>
+            <a:endParaRPr lang="en-GB"/>
           </a:p>
         </p:txBody>
       </p:sp>

</xml_diff>

<commit_message>
Completed more model predictions sets, modified 'source' Python files to work with these, created the 'assess_nsaaV2_file.cmd' and 'file_mover.py' files, added more to experiment and results discussion, and added a report parts on DMD background and an RNN overview.
</commit_message>
<xml_diff>
--- a/report_stuff/Script pipeline diagram.pptx
+++ b/report_stuff/Script pipeline diagram.pptx
@@ -273,7 +273,7 @@
           <a:p>
             <a:fld id="{ADB34385-8596-4F93-9C6D-76F56927ACBC}" type="datetimeFigureOut">
               <a:rPr lang="en-GB" smtClean="0"/>
-              <a:t>13/08/2019</a:t>
+              <a:t>24/08/2019</a:t>
             </a:fld>
             <a:endParaRPr lang="en-GB"/>
           </a:p>
@@ -473,7 +473,7 @@
           <a:p>
             <a:fld id="{ADB34385-8596-4F93-9C6D-76F56927ACBC}" type="datetimeFigureOut">
               <a:rPr lang="en-GB" smtClean="0"/>
-              <a:t>13/08/2019</a:t>
+              <a:t>24/08/2019</a:t>
             </a:fld>
             <a:endParaRPr lang="en-GB"/>
           </a:p>
@@ -683,7 +683,7 @@
           <a:p>
             <a:fld id="{ADB34385-8596-4F93-9C6D-76F56927ACBC}" type="datetimeFigureOut">
               <a:rPr lang="en-GB" smtClean="0"/>
-              <a:t>13/08/2019</a:t>
+              <a:t>24/08/2019</a:t>
             </a:fld>
             <a:endParaRPr lang="en-GB"/>
           </a:p>
@@ -883,7 +883,7 @@
           <a:p>
             <a:fld id="{ADB34385-8596-4F93-9C6D-76F56927ACBC}" type="datetimeFigureOut">
               <a:rPr lang="en-GB" smtClean="0"/>
-              <a:t>13/08/2019</a:t>
+              <a:t>24/08/2019</a:t>
             </a:fld>
             <a:endParaRPr lang="en-GB"/>
           </a:p>
@@ -1159,7 +1159,7 @@
           <a:p>
             <a:fld id="{ADB34385-8596-4F93-9C6D-76F56927ACBC}" type="datetimeFigureOut">
               <a:rPr lang="en-GB" smtClean="0"/>
-              <a:t>13/08/2019</a:t>
+              <a:t>24/08/2019</a:t>
             </a:fld>
             <a:endParaRPr lang="en-GB"/>
           </a:p>
@@ -1427,7 +1427,7 @@
           <a:p>
             <a:fld id="{ADB34385-8596-4F93-9C6D-76F56927ACBC}" type="datetimeFigureOut">
               <a:rPr lang="en-GB" smtClean="0"/>
-              <a:t>13/08/2019</a:t>
+              <a:t>24/08/2019</a:t>
             </a:fld>
             <a:endParaRPr lang="en-GB"/>
           </a:p>
@@ -1842,7 +1842,7 @@
           <a:p>
             <a:fld id="{ADB34385-8596-4F93-9C6D-76F56927ACBC}" type="datetimeFigureOut">
               <a:rPr lang="en-GB" smtClean="0"/>
-              <a:t>13/08/2019</a:t>
+              <a:t>24/08/2019</a:t>
             </a:fld>
             <a:endParaRPr lang="en-GB"/>
           </a:p>
@@ -1984,7 +1984,7 @@
           <a:p>
             <a:fld id="{ADB34385-8596-4F93-9C6D-76F56927ACBC}" type="datetimeFigureOut">
               <a:rPr lang="en-GB" smtClean="0"/>
-              <a:t>13/08/2019</a:t>
+              <a:t>24/08/2019</a:t>
             </a:fld>
             <a:endParaRPr lang="en-GB"/>
           </a:p>
@@ -2097,7 +2097,7 @@
           <a:p>
             <a:fld id="{ADB34385-8596-4F93-9C6D-76F56927ACBC}" type="datetimeFigureOut">
               <a:rPr lang="en-GB" smtClean="0"/>
-              <a:t>13/08/2019</a:t>
+              <a:t>24/08/2019</a:t>
             </a:fld>
             <a:endParaRPr lang="en-GB"/>
           </a:p>
@@ -2410,7 +2410,7 @@
           <a:p>
             <a:fld id="{ADB34385-8596-4F93-9C6D-76F56927ACBC}" type="datetimeFigureOut">
               <a:rPr lang="en-GB" smtClean="0"/>
-              <a:t>13/08/2019</a:t>
+              <a:t>24/08/2019</a:t>
             </a:fld>
             <a:endParaRPr lang="en-GB"/>
           </a:p>
@@ -2699,7 +2699,7 @@
           <a:p>
             <a:fld id="{ADB34385-8596-4F93-9C6D-76F56927ACBC}" type="datetimeFigureOut">
               <a:rPr lang="en-GB" smtClean="0"/>
-              <a:t>13/08/2019</a:t>
+              <a:t>24/08/2019</a:t>
             </a:fld>
             <a:endParaRPr lang="en-GB"/>
           </a:p>
@@ -2942,7 +2942,7 @@
           <a:p>
             <a:fld id="{ADB34385-8596-4F93-9C6D-76F56927ACBC}" type="datetimeFigureOut">
               <a:rPr lang="en-GB" smtClean="0"/>
-              <a:t>13/08/2019</a:t>
+              <a:t>24/08/2019</a:t>
             </a:fld>
             <a:endParaRPr lang="en-GB"/>
           </a:p>
@@ -3375,7 +3375,7 @@
         </p:nvSpPr>
         <p:spPr bwMode="auto">
           <a:xfrm>
-            <a:off x="2337606" y="80913"/>
+            <a:off x="2417093" y="406033"/>
             <a:ext cx="1376362" cy="446088"/>
           </a:xfrm>
           <a:prstGeom prst="rect">
@@ -3468,7 +3468,7 @@
         </p:nvSpPr>
         <p:spPr bwMode="auto">
           <a:xfrm>
-            <a:off x="2219073" y="1106862"/>
+            <a:off x="2298560" y="1431982"/>
             <a:ext cx="1365250" cy="288925"/>
           </a:xfrm>
           <a:prstGeom prst="rect">
@@ -3561,7 +3561,7 @@
         </p:nvSpPr>
         <p:spPr bwMode="auto">
           <a:xfrm>
-            <a:off x="2380652" y="3047538"/>
+            <a:off x="2460139" y="3372658"/>
             <a:ext cx="1033462" cy="276225"/>
           </a:xfrm>
           <a:prstGeom prst="rect">
@@ -3654,7 +3654,7 @@
         </p:nvSpPr>
         <p:spPr bwMode="auto">
           <a:xfrm>
-            <a:off x="2537539" y="4799951"/>
+            <a:off x="2617026" y="5125071"/>
             <a:ext cx="649287" cy="307975"/>
           </a:xfrm>
           <a:prstGeom prst="rect">
@@ -3747,7 +3747,7 @@
         </p:nvSpPr>
         <p:spPr bwMode="auto">
           <a:xfrm>
-            <a:off x="120505" y="3028420"/>
+            <a:off x="199992" y="3353540"/>
             <a:ext cx="1573213" cy="287338"/>
           </a:xfrm>
           <a:prstGeom prst="rect">
@@ -3840,7 +3840,7 @@
         </p:nvSpPr>
         <p:spPr bwMode="auto">
           <a:xfrm>
-            <a:off x="3983002" y="3038173"/>
+            <a:off x="4062489" y="3363293"/>
             <a:ext cx="1427162" cy="268288"/>
           </a:xfrm>
           <a:prstGeom prst="rect">
@@ -3933,7 +3933,7 @@
         </p:nvSpPr>
         <p:spPr bwMode="auto">
           <a:xfrm>
-            <a:off x="6646083" y="4751372"/>
+            <a:off x="6725570" y="5076492"/>
             <a:ext cx="1284288" cy="301625"/>
           </a:xfrm>
           <a:prstGeom prst="rect">
@@ -4026,7 +4026,7 @@
         </p:nvSpPr>
         <p:spPr bwMode="auto">
           <a:xfrm>
-            <a:off x="2240100" y="2026755"/>
+            <a:off x="2319587" y="2351875"/>
             <a:ext cx="1322388" cy="414338"/>
           </a:xfrm>
           <a:prstGeom prst="rect">
@@ -4119,7 +4119,7 @@
         </p:nvSpPr>
         <p:spPr bwMode="auto">
           <a:xfrm>
-            <a:off x="2240100" y="3933678"/>
+            <a:off x="2319587" y="4258798"/>
             <a:ext cx="1231900" cy="417513"/>
           </a:xfrm>
           <a:prstGeom prst="rect">
@@ -4212,7 +4212,7 @@
         </p:nvSpPr>
         <p:spPr bwMode="auto">
           <a:xfrm>
-            <a:off x="1483536" y="5718117"/>
+            <a:off x="1563023" y="6043237"/>
             <a:ext cx="1363662" cy="769441"/>
           </a:xfrm>
           <a:prstGeom prst="rect">
@@ -4305,7 +4305,7 @@
         </p:nvSpPr>
         <p:spPr bwMode="auto">
           <a:xfrm>
-            <a:off x="2955742" y="5715341"/>
+            <a:off x="3035229" y="6040461"/>
             <a:ext cx="1233488" cy="769441"/>
           </a:xfrm>
           <a:prstGeom prst="rect">
@@ -4398,7 +4398,7 @@
         </p:nvSpPr>
         <p:spPr bwMode="auto">
           <a:xfrm>
-            <a:off x="4297774" y="5710977"/>
+            <a:off x="4377261" y="6036097"/>
             <a:ext cx="1427163" cy="768350"/>
           </a:xfrm>
           <a:prstGeom prst="rect">
@@ -4493,7 +4493,7 @@
         </p:nvSpPr>
         <p:spPr bwMode="auto">
           <a:xfrm>
-            <a:off x="153072" y="3928027"/>
+            <a:off x="232559" y="4253147"/>
             <a:ext cx="1304925" cy="473075"/>
           </a:xfrm>
           <a:prstGeom prst="rect">
@@ -4586,7 +4586,7 @@
         </p:nvSpPr>
         <p:spPr bwMode="auto">
           <a:xfrm>
-            <a:off x="3808389" y="1855623"/>
+            <a:off x="3887876" y="2180743"/>
             <a:ext cx="1849438" cy="591768"/>
           </a:xfrm>
           <a:prstGeom prst="rect">
@@ -4679,7 +4679,7 @@
         </p:nvSpPr>
         <p:spPr bwMode="auto">
           <a:xfrm>
-            <a:off x="3934991" y="3872559"/>
+            <a:off x="4014478" y="4197679"/>
             <a:ext cx="1601788" cy="269875"/>
           </a:xfrm>
           <a:prstGeom prst="rect">
@@ -4772,7 +4772,7 @@
         </p:nvSpPr>
         <p:spPr bwMode="auto">
           <a:xfrm>
-            <a:off x="5102573" y="764374"/>
+            <a:off x="5182060" y="1089494"/>
             <a:ext cx="891957" cy="769441"/>
           </a:xfrm>
           <a:prstGeom prst="rect">
@@ -4865,7 +4865,7 @@
         </p:nvSpPr>
         <p:spPr bwMode="auto">
           <a:xfrm>
-            <a:off x="265109" y="1082675"/>
+            <a:off x="344596" y="1407795"/>
             <a:ext cx="1165225" cy="273050"/>
           </a:xfrm>
           <a:prstGeom prst="rect">
@@ -4958,7 +4958,7 @@
         </p:nvSpPr>
         <p:spPr bwMode="auto">
           <a:xfrm>
-            <a:off x="105586" y="83138"/>
+            <a:off x="185073" y="408258"/>
             <a:ext cx="1377950" cy="387717"/>
           </a:xfrm>
           <a:prstGeom prst="rect">
@@ -5051,7 +5051,7 @@
         </p:nvSpPr>
         <p:spPr bwMode="auto">
           <a:xfrm>
-            <a:off x="-26992" y="1951086"/>
+            <a:off x="52495" y="2276206"/>
             <a:ext cx="1790560" cy="431800"/>
           </a:xfrm>
           <a:prstGeom prst="rect">
@@ -5162,7 +5162,7 @@
         </p:blipFill>
         <p:spPr bwMode="auto">
           <a:xfrm>
-            <a:off x="6903635" y="5575730"/>
+            <a:off x="6983122" y="5900850"/>
             <a:ext cx="889000" cy="768350"/>
           </a:xfrm>
           <a:prstGeom prst="rect">
@@ -5194,7 +5194,7 @@
         </p:nvSpPr>
         <p:spPr>
           <a:xfrm>
-            <a:off x="2786128" y="557757"/>
+            <a:off x="2865615" y="882877"/>
             <a:ext cx="231140" cy="522605"/>
           </a:xfrm>
           <a:prstGeom prst="downArrow">
@@ -5239,7 +5239,7 @@
         </p:nvSpPr>
         <p:spPr>
           <a:xfrm>
-            <a:off x="2788582" y="1478733"/>
+            <a:off x="2868069" y="1803853"/>
             <a:ext cx="225425" cy="546735"/>
           </a:xfrm>
           <a:prstGeom prst="downArrow">
@@ -5284,7 +5284,7 @@
         </p:nvSpPr>
         <p:spPr>
           <a:xfrm>
-            <a:off x="2766039" y="2452721"/>
+            <a:off x="2845526" y="2777841"/>
             <a:ext cx="270510" cy="522605"/>
           </a:xfrm>
           <a:prstGeom prst="downArrow">
@@ -5329,7 +5329,7 @@
         </p:nvSpPr>
         <p:spPr>
           <a:xfrm>
-            <a:off x="2741169" y="3404801"/>
+            <a:off x="2820656" y="3729921"/>
             <a:ext cx="222250" cy="525780"/>
           </a:xfrm>
           <a:prstGeom prst="downArrow">
@@ -5374,7 +5374,7 @@
         </p:nvSpPr>
         <p:spPr>
           <a:xfrm>
-            <a:off x="2714326" y="4377717"/>
+            <a:off x="2793813" y="4702837"/>
             <a:ext cx="249093" cy="396733"/>
           </a:xfrm>
           <a:prstGeom prst="downArrow">
@@ -5419,7 +5419,7 @@
         </p:nvSpPr>
         <p:spPr>
           <a:xfrm rot="4312140">
-            <a:off x="1614174" y="4517101"/>
+            <a:off x="1693661" y="4842221"/>
             <a:ext cx="159089" cy="1715045"/>
           </a:xfrm>
           <a:prstGeom prst="downArrow">
@@ -5464,7 +5464,7 @@
         </p:nvSpPr>
         <p:spPr>
           <a:xfrm rot="2393272">
-            <a:off x="2502692" y="5080317"/>
+            <a:off x="2582179" y="5405437"/>
             <a:ext cx="151503" cy="608139"/>
           </a:xfrm>
           <a:prstGeom prst="downArrow">
@@ -5509,7 +5509,7 @@
         </p:nvSpPr>
         <p:spPr>
           <a:xfrm rot="17647526">
-            <a:off x="3765777" y="4682172"/>
+            <a:off x="3845264" y="5007292"/>
             <a:ext cx="180780" cy="1351851"/>
           </a:xfrm>
           <a:prstGeom prst="downArrow">
@@ -5554,7 +5554,7 @@
         </p:nvSpPr>
         <p:spPr>
           <a:xfrm>
-            <a:off x="687243" y="497840"/>
+            <a:off x="766730" y="822960"/>
             <a:ext cx="239395" cy="522605"/>
           </a:xfrm>
           <a:prstGeom prst="downArrow">
@@ -5599,7 +5599,7 @@
         </p:nvSpPr>
         <p:spPr>
           <a:xfrm>
-            <a:off x="696132" y="1388400"/>
+            <a:off x="775619" y="1713520"/>
             <a:ext cx="221615" cy="522605"/>
           </a:xfrm>
           <a:prstGeom prst="downArrow">
@@ -5644,7 +5644,7 @@
         </p:nvSpPr>
         <p:spPr>
           <a:xfrm rot="3856839">
-            <a:off x="1492614" y="-67151"/>
+            <a:off x="1572101" y="257969"/>
             <a:ext cx="220634" cy="1506348"/>
           </a:xfrm>
           <a:prstGeom prst="downArrow">
@@ -5689,7 +5689,7 @@
         </p:nvSpPr>
         <p:spPr>
           <a:xfrm rot="991217">
-            <a:off x="1701922" y="344670"/>
+            <a:off x="1781409" y="669790"/>
             <a:ext cx="209009" cy="2688356"/>
           </a:xfrm>
           <a:prstGeom prst="downArrow">
@@ -5734,7 +5734,7 @@
         </p:nvSpPr>
         <p:spPr>
           <a:xfrm>
-            <a:off x="685838" y="2463482"/>
+            <a:off x="765325" y="2788602"/>
             <a:ext cx="239395" cy="522605"/>
           </a:xfrm>
           <a:prstGeom prst="downArrow">
@@ -5779,7 +5779,7 @@
         </p:nvSpPr>
         <p:spPr>
           <a:xfrm>
-            <a:off x="685838" y="3404801"/>
+            <a:off x="765325" y="3729921"/>
             <a:ext cx="239395" cy="522605"/>
           </a:xfrm>
           <a:prstGeom prst="downArrow">
@@ -5824,7 +5824,7 @@
         </p:nvSpPr>
         <p:spPr>
           <a:xfrm rot="17501080">
-            <a:off x="1782151" y="3997451"/>
+            <a:off x="1861638" y="4322571"/>
             <a:ext cx="262255" cy="1197980"/>
           </a:xfrm>
           <a:prstGeom prst="downArrow">
@@ -5871,7 +5871,7 @@
         </p:nvSpPr>
         <p:spPr bwMode="auto">
           <a:xfrm>
-            <a:off x="67665" y="5718117"/>
+            <a:off x="147152" y="6043237"/>
             <a:ext cx="1311275" cy="769441"/>
           </a:xfrm>
           <a:prstGeom prst="rect">
@@ -5963,7 +5963,7 @@
         </p:nvSpPr>
         <p:spPr>
           <a:xfrm rot="19528202">
-            <a:off x="2959495" y="5100212"/>
+            <a:off x="3038982" y="5425332"/>
             <a:ext cx="161290" cy="555787"/>
           </a:xfrm>
           <a:prstGeom prst="downArrow">
@@ -6023,7 +6023,7 @@
         </p:blipFill>
         <p:spPr bwMode="auto">
           <a:xfrm>
-            <a:off x="3730730" y="614188"/>
+            <a:off x="3810217" y="939308"/>
             <a:ext cx="1239838" cy="990600"/>
           </a:xfrm>
           <a:prstGeom prst="rect">
@@ -6055,7 +6055,7 @@
         </p:nvSpPr>
         <p:spPr>
           <a:xfrm rot="12647794">
-            <a:off x="3493035" y="3240310"/>
+            <a:off x="3572522" y="3565430"/>
             <a:ext cx="219462" cy="1645688"/>
           </a:xfrm>
           <a:prstGeom prst="downArrow">
@@ -6100,7 +6100,7 @@
         </p:nvSpPr>
         <p:spPr>
           <a:xfrm rot="16200000">
-            <a:off x="3693476" y="4396918"/>
+            <a:off x="3772963" y="4722038"/>
             <a:ext cx="238760" cy="1089025"/>
           </a:xfrm>
           <a:prstGeom prst="downArrow">
@@ -6147,7 +6147,7 @@
         </p:nvSpPr>
         <p:spPr bwMode="auto">
           <a:xfrm>
-            <a:off x="4389140" y="4761422"/>
+            <a:off x="4468627" y="5086542"/>
             <a:ext cx="1257300" cy="311150"/>
           </a:xfrm>
           <a:prstGeom prst="rect">
@@ -6238,7 +6238,7 @@
         </p:nvSpPr>
         <p:spPr>
           <a:xfrm rot="16200000">
-            <a:off x="6060296" y="4450383"/>
+            <a:off x="6139783" y="4775503"/>
             <a:ext cx="204470" cy="903605"/>
           </a:xfrm>
           <a:prstGeom prst="downArrow">
@@ -6283,7 +6283,7 @@
         </p:nvSpPr>
         <p:spPr>
           <a:xfrm>
-            <a:off x="7152972" y="5107926"/>
+            <a:off x="7232459" y="5433046"/>
             <a:ext cx="270510" cy="376555"/>
           </a:xfrm>
           <a:prstGeom prst="downArrow">
@@ -6328,7 +6328,7 @@
         </p:nvSpPr>
         <p:spPr>
           <a:xfrm rot="19997345">
-            <a:off x="832793" y="1514336"/>
+            <a:off x="912280" y="1839456"/>
             <a:ext cx="1438671" cy="202001"/>
           </a:xfrm>
           <a:prstGeom prst="rightArrow">
@@ -6373,7 +6373,7 @@
         </p:nvSpPr>
         <p:spPr>
           <a:xfrm>
-            <a:off x="4555613" y="2507111"/>
+            <a:off x="4635100" y="2832231"/>
             <a:ext cx="281940" cy="485140"/>
           </a:xfrm>
           <a:prstGeom prst="downArrow">
@@ -6418,7 +6418,7 @@
         </p:nvSpPr>
         <p:spPr>
           <a:xfrm>
-            <a:off x="4542940" y="3365817"/>
+            <a:off x="4622427" y="3690937"/>
             <a:ext cx="281940" cy="485140"/>
           </a:xfrm>
           <a:prstGeom prst="downArrow">
@@ -6463,7 +6463,7 @@
         </p:nvSpPr>
         <p:spPr>
           <a:xfrm>
-            <a:off x="6325836" y="213838"/>
+            <a:off x="6405323" y="538958"/>
             <a:ext cx="1284289" cy="600164"/>
           </a:xfrm>
           <a:prstGeom prst="rect">
@@ -6510,7 +6510,7 @@
         </p:nvSpPr>
         <p:spPr>
           <a:xfrm>
-            <a:off x="6264375" y="3038762"/>
+            <a:off x="6343862" y="3363882"/>
             <a:ext cx="1125273" cy="261610"/>
           </a:xfrm>
           <a:prstGeom prst="rect">
@@ -6550,7 +6550,7 @@
         </p:nvSpPr>
         <p:spPr>
           <a:xfrm rot="5400000">
-            <a:off x="5738209" y="2808285"/>
+            <a:off x="5817696" y="3133405"/>
             <a:ext cx="206375" cy="722566"/>
           </a:xfrm>
           <a:prstGeom prst="downArrow">
@@ -6595,7 +6595,7 @@
         </p:nvSpPr>
         <p:spPr>
           <a:xfrm>
-            <a:off x="98205" y="4823329"/>
+            <a:off x="177692" y="5148449"/>
             <a:ext cx="1377950" cy="261610"/>
           </a:xfrm>
           <a:prstGeom prst="rect">
@@ -6635,7 +6635,7 @@
         </p:nvSpPr>
         <p:spPr>
           <a:xfrm rot="16200000">
-            <a:off x="1931219" y="4481668"/>
+            <a:off x="2010706" y="4806788"/>
             <a:ext cx="172633" cy="958615"/>
           </a:xfrm>
           <a:prstGeom prst="downArrow">
@@ -6680,7 +6680,7 @@
         </p:nvSpPr>
         <p:spPr>
           <a:xfrm>
-            <a:off x="6032548" y="2018480"/>
+            <a:off x="6112035" y="2343600"/>
             <a:ext cx="1710690" cy="430887"/>
           </a:xfrm>
           <a:prstGeom prst="rect">
@@ -6720,7 +6720,7 @@
         </p:nvSpPr>
         <p:spPr>
           <a:xfrm>
-            <a:off x="6686041" y="2507111"/>
+            <a:off x="6765528" y="2832231"/>
             <a:ext cx="281940" cy="485140"/>
           </a:xfrm>
           <a:prstGeom prst="downArrow">
@@ -6765,7 +6765,7 @@
         </p:nvSpPr>
         <p:spPr>
           <a:xfrm>
-            <a:off x="6217251" y="1011066"/>
+            <a:off x="6296738" y="1336186"/>
             <a:ext cx="1417402" cy="769441"/>
           </a:xfrm>
           <a:prstGeom prst="rect">
@@ -6812,7 +6812,7 @@
         </p:nvSpPr>
         <p:spPr>
           <a:xfrm>
-            <a:off x="8449141" y="1707146"/>
+            <a:off x="8528628" y="2032266"/>
             <a:ext cx="3314906" cy="2920171"/>
           </a:xfrm>
           <a:prstGeom prst="rect">
@@ -6866,7 +6866,7 @@
         </p:nvSpPr>
         <p:spPr>
           <a:xfrm>
-            <a:off x="8449141" y="1707146"/>
+            <a:off x="8528628" y="2032266"/>
             <a:ext cx="3314906" cy="369332"/>
           </a:xfrm>
           <a:prstGeom prst="rect">
@@ -6907,7 +6907,7 @@
         </p:nvSpPr>
         <p:spPr>
           <a:xfrm>
-            <a:off x="8518991" y="2287919"/>
+            <a:off x="8598478" y="2613039"/>
             <a:ext cx="856987" cy="222432"/>
           </a:xfrm>
           <a:prstGeom prst="rect">
@@ -6946,7 +6946,7 @@
         </p:nvSpPr>
         <p:spPr bwMode="auto">
           <a:xfrm>
-            <a:off x="8518987" y="3818568"/>
+            <a:off x="8598474" y="4143688"/>
             <a:ext cx="856987" cy="221593"/>
           </a:xfrm>
           <a:prstGeom prst="rect">
@@ -7024,7 +7024,7 @@
         </p:nvSpPr>
         <p:spPr bwMode="auto">
           <a:xfrm>
-            <a:off x="8518988" y="3306780"/>
+            <a:off x="8598475" y="3631900"/>
             <a:ext cx="856987" cy="221593"/>
           </a:xfrm>
           <a:prstGeom prst="rect">
@@ -7104,7 +7104,7 @@
         </p:nvSpPr>
         <p:spPr bwMode="auto">
           <a:xfrm>
-            <a:off x="8518989" y="2794992"/>
+            <a:off x="8598476" y="3120112"/>
             <a:ext cx="856987" cy="221593"/>
           </a:xfrm>
           <a:prstGeom prst="rect">
@@ -7180,7 +7180,7 @@
         </p:nvSpPr>
         <p:spPr>
           <a:xfrm>
-            <a:off x="8531980" y="4286427"/>
+            <a:off x="8611467" y="4611547"/>
             <a:ext cx="856987" cy="261610"/>
           </a:xfrm>
           <a:prstGeom prst="rect">
@@ -7215,7 +7215,7 @@
         </p:nvSpPr>
         <p:spPr>
           <a:xfrm>
-            <a:off x="9471805" y="2262511"/>
+            <a:off x="9551292" y="2587631"/>
             <a:ext cx="2121171" cy="2292935"/>
           </a:xfrm>
           <a:prstGeom prst="rect">
@@ -7298,7 +7298,7 @@
         </p:nvSpPr>
         <p:spPr>
           <a:xfrm rot="16200000">
-            <a:off x="5949546" y="3555125"/>
+            <a:off x="6029033" y="3880245"/>
             <a:ext cx="204470" cy="903605"/>
           </a:xfrm>
           <a:prstGeom prst="downArrow">
@@ -7345,7 +7345,7 @@
         </p:nvSpPr>
         <p:spPr bwMode="auto">
           <a:xfrm>
-            <a:off x="6555297" y="3850771"/>
+            <a:off x="6634784" y="4175891"/>
             <a:ext cx="1636849" cy="301625"/>
           </a:xfrm>
           <a:prstGeom prst="rect">
@@ -7436,7 +7436,7 @@
         </p:nvSpPr>
         <p:spPr>
           <a:xfrm rot="16200000">
-            <a:off x="3887848" y="83444"/>
+            <a:off x="3967335" y="408564"/>
             <a:ext cx="206375" cy="407035"/>
           </a:xfrm>
           <a:prstGeom prst="downArrow">
@@ -7483,7 +7483,7 @@
         </p:nvSpPr>
         <p:spPr bwMode="auto">
           <a:xfrm>
-            <a:off x="4232159" y="142371"/>
+            <a:off x="4311646" y="467491"/>
             <a:ext cx="1141465" cy="288925"/>
           </a:xfrm>
           <a:prstGeom prst="rect">
@@ -7600,7 +7600,7 @@
         </p:nvSpPr>
         <p:spPr>
           <a:xfrm>
-            <a:off x="4630759" y="513920"/>
+            <a:off x="4710246" y="839040"/>
             <a:ext cx="249093" cy="396733"/>
           </a:xfrm>
           <a:prstGeom prst="downArrow">
@@ -7628,6 +7628,175 @@
           <a:lstStyle/>
           <a:p>
             <a:endParaRPr lang="en-GB"/>
+          </a:p>
+        </p:txBody>
+      </p:sp>
+      <p:sp>
+        <p:nvSpPr>
+          <p:cNvPr id="4" name="Arrow: Bent-Up 3">
+            <a:extLst>
+              <a:ext uri="{FF2B5EF4-FFF2-40B4-BE49-F238E27FC236}">
+                <a16:creationId xmlns:a16="http://schemas.microsoft.com/office/drawing/2014/main" id="{081943B0-CD34-40D2-9664-69E61A429733}"/>
+              </a:ext>
+            </a:extLst>
+          </p:cNvPr>
+          <p:cNvSpPr/>
+          <p:nvPr/>
+        </p:nvSpPr>
+        <p:spPr>
+          <a:xfrm rot="10800000">
+            <a:off x="2865614" y="95785"/>
+            <a:ext cx="1470165" cy="288925"/>
+          </a:xfrm>
+          <a:prstGeom prst="bentUpArrow">
+            <a:avLst>
+              <a:gd name="adj1" fmla="val 34700"/>
+              <a:gd name="adj2" fmla="val 40358"/>
+              <a:gd name="adj3" fmla="val 50000"/>
+            </a:avLst>
+          </a:prstGeom>
+        </p:spPr>
+        <p:style>
+          <a:lnRef idx="2">
+            <a:schemeClr val="accent1">
+              <a:shade val="50000"/>
+            </a:schemeClr>
+          </a:lnRef>
+          <a:fillRef idx="1">
+            <a:schemeClr val="accent1"/>
+          </a:fillRef>
+          <a:effectRef idx="0">
+            <a:schemeClr val="accent1"/>
+          </a:effectRef>
+          <a:fontRef idx="minor">
+            <a:schemeClr val="lt1"/>
+          </a:fontRef>
+        </p:style>
+        <p:txBody>
+          <a:bodyPr rtlCol="0" anchor="ctr"/>
+          <a:lstStyle/>
+          <a:p>
+            <a:pPr algn="ctr"/>
+            <a:endParaRPr lang="en-GB"/>
+          </a:p>
+        </p:txBody>
+      </p:sp>
+      <p:sp>
+        <p:nvSpPr>
+          <p:cNvPr id="72" name="TextBox 4">
+            <a:extLst>
+              <a:ext uri="{FF2B5EF4-FFF2-40B4-BE49-F238E27FC236}">
+                <a16:creationId xmlns:a16="http://schemas.microsoft.com/office/drawing/2014/main" id="{00AA9A97-A4CF-4986-8A07-F0B5434AF254}"/>
+              </a:ext>
+            </a:extLst>
+          </p:cNvPr>
+          <p:cNvSpPr txBox="1">
+            <a:spLocks noChangeArrowheads="1"/>
+          </p:cNvSpPr>
+          <p:nvPr/>
+        </p:nvSpPr>
+        <p:spPr bwMode="auto">
+          <a:xfrm>
+            <a:off x="4365551" y="26021"/>
+            <a:ext cx="1141465" cy="288925"/>
+          </a:xfrm>
+          <a:prstGeom prst="rect">
+            <a:avLst/>
+          </a:prstGeom>
+          <a:noFill/>
+          <a:ln w="9525">
+            <a:solidFill>
+              <a:srgbClr val="000000"/>
+            </a:solidFill>
+            <a:miter lim="800000"/>
+            <a:headEnd/>
+            <a:tailEnd/>
+          </a:ln>
+          <a:extLst>
+            <a:ext uri="{909E8E84-426E-40DD-AFC4-6F175D3DCCD1}">
+              <a14:hiddenFill xmlns:a14="http://schemas.microsoft.com/office/drawing/2010/main">
+                <a:solidFill>
+                  <a:srgbClr val="FFFFFF"/>
+                </a:solidFill>
+              </a14:hiddenFill>
+            </a:ext>
+          </a:extLst>
+        </p:spPr>
+        <p:txBody>
+          <a:bodyPr vert="horz" wrap="square" lIns="91440" tIns="45720" rIns="91440" bIns="45720" numCol="1" anchor="t" anchorCtr="0" compatLnSpc="1">
+            <a:prstTxWarp prst="textNoShape">
+              <a:avLst/>
+            </a:prstTxWarp>
+          </a:bodyPr>
+          <a:lstStyle/>
+          <a:p>
+            <a:pPr marL="0" marR="0" lvl="0" indent="0" algn="l" defTabSz="914400" rtl="0" eaLnBrk="0" fontAlgn="base" latinLnBrk="0" hangingPunct="0">
+              <a:lnSpc>
+                <a:spcPct val="100000"/>
+              </a:lnSpc>
+              <a:spcBef>
+                <a:spcPct val="0"/>
+              </a:spcBef>
+              <a:spcAft>
+                <a:spcPct val="0"/>
+              </a:spcAft>
+              <a:buClrTx/>
+              <a:buSzTx/>
+              <a:buFontTx/>
+              <a:buNone/>
+              <a:tabLst/>
+            </a:pPr>
+            <a:r>
+              <a:rPr kumimoji="0" lang="en-US" altLang="en-US" sz="1100" b="1" i="0" u="none" strike="noStrike" cap="none" normalizeH="0" baseline="0" dirty="0">
+                <a:ln>
+                  <a:noFill/>
+                </a:ln>
+                <a:solidFill>
+                  <a:srgbClr val="000000"/>
+                </a:solidFill>
+                <a:effectLst/>
+                <a:latin typeface="Calibri" panose="020F0502020204030204" pitchFamily="34" charset="0"/>
+                <a:ea typeface="Calibri" panose="020F0502020204030204" pitchFamily="34" charset="0"/>
+                <a:cs typeface="Times New Roman" panose="02020603050405020304" pitchFamily="18" charset="0"/>
+              </a:rPr>
+              <a:t>‘</a:t>
+            </a:r>
+            <a:r>
+              <a:rPr lang="en-US" altLang="en-US" sz="1100" b="1" dirty="0">
+                <a:solidFill>
+                  <a:srgbClr val="000000"/>
+                </a:solidFill>
+                <a:latin typeface="Calibri" panose="020F0502020204030204" pitchFamily="34" charset="0"/>
+                <a:ea typeface="Calibri" panose="020F0502020204030204" pitchFamily="34" charset="0"/>
+                <a:cs typeface="Times New Roman" panose="02020603050405020304" pitchFamily="18" charset="0"/>
+              </a:rPr>
+              <a:t>file_mover.</a:t>
+            </a:r>
+            <a:r>
+              <a:rPr kumimoji="0" lang="en-US" altLang="en-US" sz="1100" b="1" i="0" u="none" strike="noStrike" cap="none" normalizeH="0" baseline="0" dirty="0">
+                <a:ln>
+                  <a:noFill/>
+                </a:ln>
+                <a:solidFill>
+                  <a:srgbClr val="000000"/>
+                </a:solidFill>
+                <a:effectLst/>
+                <a:latin typeface="Calibri" panose="020F0502020204030204" pitchFamily="34" charset="0"/>
+                <a:ea typeface="Calibri" panose="020F0502020204030204" pitchFamily="34" charset="0"/>
+                <a:cs typeface="Times New Roman" panose="02020603050405020304" pitchFamily="18" charset="0"/>
+              </a:rPr>
+              <a:t>py’</a:t>
+            </a:r>
+            <a:endParaRPr kumimoji="0" lang="en-US" altLang="en-US" sz="1800" b="0" i="0" u="none" strike="noStrike" cap="none" normalizeH="0" baseline="0" dirty="0">
+              <a:ln>
+                <a:noFill/>
+              </a:ln>
+              <a:solidFill>
+                <a:schemeClr val="tx1"/>
+              </a:solidFill>
+              <a:effectLst/>
+              <a:latin typeface="Arial" panose="020B0604020202020204" pitchFamily="34" charset="0"/>
+            </a:endParaRPr>
           </a:p>
         </p:txBody>
       </p:sp>

</xml_diff>